<commit_message>
Area finding first steps
</commit_message>
<xml_diff>
--- a/Task1-BlackbodyRadiationFitting/Blackbody.pptx
+++ b/Task1-BlackbodyRadiationFitting/Blackbody.pptx
@@ -8602,16 +8602,33 @@
             <p:ph idx="1"/>
           </p:nvPr>
         </p:nvSpPr>
-        <p:spPr/>
-        <p:txBody>
-          <a:bodyPr/>
+        <p:spPr>
+          <a:xfrm>
+            <a:off x="1000674" y="1698355"/>
+            <a:ext cx="8946541" cy="4195481"/>
+          </a:xfrm>
+        </p:spPr>
+        <p:txBody>
+          <a:bodyPr>
+            <a:normAutofit/>
+          </a:bodyPr>
           <a:lstStyle/>
           <a:p>
-            <a:r>
-              <a:rPr lang="en-US" dirty="0"/>
-              <a:t>Oria   									Slope</a:t>
-            </a:r>
-            <a:endParaRPr lang="el-GR" dirty="0"/>
+            <a:pPr marL="0" indent="0">
+              <a:buNone/>
+            </a:pPr>
+            <a:r>
+              <a:rPr lang="el-GR" sz="2800" dirty="0"/>
+              <a:t>Μέθοδος Ορίων</a:t>
+            </a:r>
+            <a:r>
+              <a:rPr lang="en-US" sz="2800" dirty="0"/>
+              <a:t>   					</a:t>
+            </a:r>
+            <a:r>
+              <a:rPr lang="el-GR" sz="2800" dirty="0"/>
+              <a:t>	    Μέθοδος Κλίσης</a:t>
+            </a:r>
           </a:p>
         </p:txBody>
       </p:sp>
@@ -8637,8 +8654,8 @@
         </p:blipFill>
         <p:spPr>
           <a:xfrm>
-            <a:off x="6158001" y="2837903"/>
-            <a:ext cx="4695825" cy="2447925"/>
+            <a:off x="6318088" y="2483339"/>
+            <a:ext cx="5903924" cy="3077705"/>
           </a:xfrm>
           <a:prstGeom prst="rect">
             <a:avLst/>
@@ -8667,8 +8684,8 @@
         </p:blipFill>
         <p:spPr>
           <a:xfrm>
-            <a:off x="947432" y="2837903"/>
-            <a:ext cx="4629150" cy="2428875"/>
+            <a:off x="0" y="2483339"/>
+            <a:ext cx="5865744" cy="3077705"/>
           </a:xfrm>
           <a:prstGeom prst="rect">
             <a:avLst/>

</xml_diff>